<commit_message>
web api basic and soapVSrest ppt added
</commit_message>
<xml_diff>
--- a/chaitanya_trainings/C# webform/ch2-130325020449-phpapp01.pptx
+++ b/chaitanya_trainings/C# webform/ch2-130325020449-phpapp01.pptx
@@ -39,10 +39,6 @@
     <p:sldId id="338" r:id="rId33"/>
     <p:sldId id="339" r:id="rId34"/>
     <p:sldId id="340" r:id="rId35"/>
-    <p:sldId id="341" r:id="rId36"/>
-    <p:sldId id="342" r:id="rId37"/>
-    <p:sldId id="343" r:id="rId38"/>
-    <p:sldId id="344" r:id="rId39"/>
   </p:sldIdLst>
   <p:sldSz cx="9144000" cy="6858000" type="screen4x3"/>
   <p:notesSz cx="6858000" cy="9144000"/>
@@ -318,7 +314,7 @@
             <a:fld id="{68DDBA7F-46E2-489B-883A-5DA3800A6DF8}" type="datetimeFigureOut">
               <a:rPr lang="en-US" smtClean="0"/>
               <a:pPr/>
-              <a:t>16/01/2013</a:t>
+              <a:t>7/26/2015</a:t>
             </a:fld>
             <a:endParaRPr lang="en-US"/>
           </a:p>
@@ -485,7 +481,7 @@
             <a:fld id="{68DDBA7F-46E2-489B-883A-5DA3800A6DF8}" type="datetimeFigureOut">
               <a:rPr lang="en-US" smtClean="0"/>
               <a:pPr/>
-              <a:t>16/01/2013</a:t>
+              <a:t>7/26/2015</a:t>
             </a:fld>
             <a:endParaRPr lang="en-US"/>
           </a:p>
@@ -662,7 +658,7 @@
             <a:fld id="{68DDBA7F-46E2-489B-883A-5DA3800A6DF8}" type="datetimeFigureOut">
               <a:rPr lang="en-US" smtClean="0"/>
               <a:pPr/>
-              <a:t>16/01/2013</a:t>
+              <a:t>7/26/2015</a:t>
             </a:fld>
             <a:endParaRPr lang="en-US"/>
           </a:p>
@@ -829,7 +825,7 @@
             <a:fld id="{68DDBA7F-46E2-489B-883A-5DA3800A6DF8}" type="datetimeFigureOut">
               <a:rPr lang="en-US" smtClean="0"/>
               <a:pPr/>
-              <a:t>16/01/2013</a:t>
+              <a:t>7/26/2015</a:t>
             </a:fld>
             <a:endParaRPr lang="en-US"/>
           </a:p>
@@ -1073,7 +1069,7 @@
             <a:fld id="{68DDBA7F-46E2-489B-883A-5DA3800A6DF8}" type="datetimeFigureOut">
               <a:rPr lang="en-US" smtClean="0"/>
               <a:pPr/>
-              <a:t>16/01/2013</a:t>
+              <a:t>7/26/2015</a:t>
             </a:fld>
             <a:endParaRPr lang="en-US"/>
           </a:p>
@@ -1339,7 +1335,7 @@
             <a:fld id="{68DDBA7F-46E2-489B-883A-5DA3800A6DF8}" type="datetimeFigureOut">
               <a:rPr lang="en-US" smtClean="0"/>
               <a:pPr/>
-              <a:t>16/01/2013</a:t>
+              <a:t>7/26/2015</a:t>
             </a:fld>
             <a:endParaRPr lang="en-US"/>
           </a:p>
@@ -1719,7 +1715,7 @@
             <a:fld id="{68DDBA7F-46E2-489B-883A-5DA3800A6DF8}" type="datetimeFigureOut">
               <a:rPr lang="en-US" smtClean="0"/>
               <a:pPr/>
-              <a:t>16/01/2013</a:t>
+              <a:t>7/26/2015</a:t>
             </a:fld>
             <a:endParaRPr lang="en-US"/>
           </a:p>
@@ -1871,7 +1867,7 @@
             <a:fld id="{68DDBA7F-46E2-489B-883A-5DA3800A6DF8}" type="datetimeFigureOut">
               <a:rPr lang="en-US" smtClean="0"/>
               <a:pPr/>
-              <a:t>16/01/2013</a:t>
+              <a:t>7/26/2015</a:t>
             </a:fld>
             <a:endParaRPr lang="en-US"/>
           </a:p>
@@ -1963,7 +1959,7 @@
             <a:fld id="{68DDBA7F-46E2-489B-883A-5DA3800A6DF8}" type="datetimeFigureOut">
               <a:rPr lang="en-US" smtClean="0"/>
               <a:pPr/>
-              <a:t>16/01/2013</a:t>
+              <a:t>7/26/2015</a:t>
             </a:fld>
             <a:endParaRPr lang="en-US"/>
           </a:p>
@@ -2226,7 +2222,7 @@
             <a:fld id="{68DDBA7F-46E2-489B-883A-5DA3800A6DF8}" type="datetimeFigureOut">
               <a:rPr lang="en-US" smtClean="0"/>
               <a:pPr/>
-              <a:t>16/01/2013</a:t>
+              <a:t>7/26/2015</a:t>
             </a:fld>
             <a:endParaRPr lang="en-US"/>
           </a:p>
@@ -2516,7 +2512,7 @@
             <a:fld id="{68DDBA7F-46E2-489B-883A-5DA3800A6DF8}" type="datetimeFigureOut">
               <a:rPr lang="en-US" smtClean="0"/>
               <a:pPr/>
-              <a:t>16/01/2013</a:t>
+              <a:t>7/26/2015</a:t>
             </a:fld>
             <a:endParaRPr lang="en-US"/>
           </a:p>
@@ -3289,7 +3285,7 @@
             <a:fld id="{68DDBA7F-46E2-489B-883A-5DA3800A6DF8}" type="datetimeFigureOut">
               <a:rPr lang="en-US" smtClean="0"/>
               <a:pPr/>
-              <a:t>16/01/2013</a:t>
+              <a:t>7/26/2015</a:t>
             </a:fld>
             <a:endParaRPr lang="en-US"/>
           </a:p>
@@ -4168,24 +4164,7 @@
                 <a:ea typeface="+mj-ea"/>
                 <a:cs typeface="+mj-cs"/>
               </a:rPr>
-              <a:t>               </a:t>
-            </a:r>
-            <a:r>
-              <a:rPr kumimoji="0" lang="en-US" sz="5000" b="1" i="0" u="none" strike="noStrike" kern="1200" cap="none" spc="0" normalizeH="0" baseline="0" noProof="0" dirty="0" smtClean="0">
-                <a:ln>
-                  <a:noFill/>
-                </a:ln>
-                <a:solidFill>
-                  <a:schemeClr val="tx2"/>
-                </a:solidFill>
-                <a:effectLst/>
-                <a:uLnTx/>
-                <a:uFillTx/>
-                <a:latin typeface="+mj-lt"/>
-                <a:ea typeface="+mj-ea"/>
-                <a:cs typeface="+mj-cs"/>
-              </a:rPr>
-              <a:t>                  </a:t>
+              <a:t>                                 </a:t>
             </a:r>
             <a:r>
               <a:rPr kumimoji="0" lang="en-US" sz="6600" b="1" i="0" u="none" strike="noStrike" kern="1200" cap="none" spc="0" normalizeH="0" baseline="0" noProof="0" dirty="0" smtClean="0">
@@ -4219,24 +4198,7 @@
                 <a:ea typeface="+mj-ea"/>
                 <a:cs typeface="+mj-cs"/>
               </a:rPr>
-              <a:t> </a:t>
-            </a:r>
-            <a:r>
-              <a:rPr kumimoji="0" lang="en-US" sz="6600" b="1" i="0" u="none" strike="noStrike" kern="1200" cap="none" spc="0" normalizeH="0" noProof="0" dirty="0" smtClean="0">
-                <a:ln>
-                  <a:noFill/>
-                </a:ln>
-                <a:solidFill>
-                  <a:schemeClr val="tx2"/>
-                </a:solidFill>
-                <a:effectLst/>
-                <a:uLnTx/>
-                <a:uFillTx/>
-                <a:latin typeface="+mj-lt"/>
-                <a:ea typeface="+mj-ea"/>
-                <a:cs typeface="+mj-cs"/>
-              </a:rPr>
-              <a:t>FORMS</a:t>
+              <a:t> FORMS</a:t>
             </a:r>
             <a:endParaRPr kumimoji="0" lang="en-US" sz="6600" b="0" i="0" u="none" strike="noStrike" kern="1200" cap="none" spc="0" normalizeH="0" baseline="0" noProof="0" dirty="0" smtClean="0">
               <a:ln>
@@ -4647,11 +4609,7 @@
           <a:p>
             <a:r>
               <a:rPr lang="en-US" b="1" dirty="0" smtClean="0"/>
-              <a:t>     </a:t>
-            </a:r>
-            <a:r>
-              <a:rPr lang="en-US" b="1" dirty="0" smtClean="0"/>
-              <a:t>                    Automatic </a:t>
+              <a:t>                         Automatic </a:t>
             </a:r>
             <a:r>
               <a:rPr lang="en-US" b="1" dirty="0" err="1" smtClean="0"/>
@@ -5470,15 +5428,7 @@
           <a:p>
             <a:r>
               <a:rPr lang="en-US" b="1" dirty="0" smtClean="0"/>
-              <a:t>                 </a:t>
-            </a:r>
-            <a:r>
-              <a:rPr lang="en-US" b="1" dirty="0" smtClean="0"/>
-              <a:t>                          View </a:t>
-            </a:r>
-            <a:r>
-              <a:rPr lang="en-US" b="1" dirty="0" smtClean="0"/>
-              <a:t>State</a:t>
+              <a:t>                                           View State</a:t>
             </a:r>
             <a:endParaRPr lang="en-US" dirty="0" smtClean="0"/>
           </a:p>
@@ -5638,6 +5588,13 @@
   <p:clrMapOvr>
     <a:masterClrMapping/>
   </p:clrMapOvr>
+  <p:timing>
+    <p:tnLst>
+      <p:par>
+        <p:cTn id="1" dur="indefinite" restart="never" nodeType="tmRoot"/>
+      </p:par>
+    </p:tnLst>
+  </p:timing>
 </p:sld>
 </file>
 
@@ -5683,15 +5640,7 @@
           <a:p>
             <a:r>
               <a:rPr lang="en-US" b="1" dirty="0" smtClean="0"/>
-              <a:t>            </a:t>
-            </a:r>
-            <a:r>
-              <a:rPr lang="en-US" b="1" dirty="0" smtClean="0"/>
-              <a:t>                   View </a:t>
-            </a:r>
-            <a:r>
-              <a:rPr lang="en-US" b="1" dirty="0" smtClean="0"/>
-              <a:t>State cont..</a:t>
+              <a:t>                               View State cont..</a:t>
             </a:r>
             <a:endParaRPr lang="en-US" dirty="0" smtClean="0"/>
           </a:p>
@@ -5881,6 +5830,13 @@
   <p:clrMapOvr>
     <a:masterClrMapping/>
   </p:clrMapOvr>
+  <p:timing>
+    <p:tnLst>
+      <p:par>
+        <p:cTn id="1" dur="indefinite" restart="never" nodeType="tmRoot"/>
+      </p:par>
+    </p:tnLst>
+  </p:timing>
 </p:sld>
 </file>
 
@@ -5928,11 +5884,7 @@
           <a:p>
             <a:r>
               <a:rPr lang="en-US" b="1" dirty="0" smtClean="0"/>
-              <a:t>View </a:t>
-            </a:r>
-            <a:r>
-              <a:rPr lang="en-US" b="1" dirty="0" smtClean="0"/>
-              <a:t>State (First Request) cont..</a:t>
+              <a:t>View State (First Request) cont..</a:t>
             </a:r>
             <a:endParaRPr lang="en-US" dirty="0" smtClean="0"/>
           </a:p>
@@ -6057,11 +6009,7 @@
           <a:p>
             <a:r>
               <a:rPr lang="en-US" b="1" dirty="0" smtClean="0"/>
-              <a:t>    View </a:t>
-            </a:r>
-            <a:r>
-              <a:rPr lang="en-US" b="1" dirty="0" smtClean="0"/>
-              <a:t>State(</a:t>
+              <a:t>    View State(</a:t>
             </a:r>
             <a:r>
               <a:rPr lang="en-US" b="1" dirty="0" err="1" smtClean="0"/>
@@ -6199,15 +6147,7 @@
           <a:p>
             <a:r>
               <a:rPr lang="en-US" b="1" dirty="0" smtClean="0"/>
-              <a:t>        </a:t>
-            </a:r>
-            <a:r>
-              <a:rPr lang="en-US" b="1" dirty="0" smtClean="0"/>
-              <a:t>                        </a:t>
-            </a:r>
-            <a:r>
-              <a:rPr lang="en-US" b="1" dirty="0" smtClean="0"/>
-              <a:t>View State cont..</a:t>
+              <a:t>                                View State cont..</a:t>
             </a:r>
             <a:endParaRPr lang="en-US" dirty="0" smtClean="0"/>
           </a:p>
@@ -7624,15 +7564,7 @@
           <a:p>
             <a:r>
               <a:rPr lang="en-US" b="1" dirty="0" smtClean="0"/>
-              <a:t>            </a:t>
-            </a:r>
-            <a:r>
-              <a:rPr lang="en-US" b="1" dirty="0" smtClean="0"/>
-              <a:t>                     Page </a:t>
-            </a:r>
-            <a:r>
-              <a:rPr lang="en-US" b="1" dirty="0" smtClean="0"/>
-              <a:t>Processing</a:t>
+              <a:t>                                 Page Processing</a:t>
             </a:r>
             <a:endParaRPr lang="en-US" dirty="0" smtClean="0"/>
           </a:p>
@@ -8306,15 +8238,7 @@
           <a:p>
             <a:r>
               <a:rPr lang="en-US" b="1" dirty="0" smtClean="0"/>
-              <a:t>      </a:t>
-            </a:r>
-            <a:r>
-              <a:rPr lang="en-US" b="1" dirty="0" smtClean="0"/>
-              <a:t>              Automatic </a:t>
-            </a:r>
-            <a:r>
-              <a:rPr lang="en-US" b="1" dirty="0" smtClean="0"/>
-              <a:t>Data Binding</a:t>
+              <a:t>                    Automatic Data Binding</a:t>
             </a:r>
             <a:endParaRPr lang="en-US" dirty="0" smtClean="0"/>
           </a:p>
@@ -8541,15 +8465,7 @@
           <a:p>
             <a:r>
               <a:rPr lang="en-US" b="1" dirty="0" smtClean="0"/>
-              <a:t>                      </a:t>
-            </a:r>
-            <a:r>
-              <a:rPr lang="en-US" b="1" dirty="0" smtClean="0"/>
-              <a:t>                         </a:t>
-            </a:r>
-            <a:r>
-              <a:rPr lang="en-US" b="1" dirty="0" smtClean="0"/>
-              <a:t>Cleanup </a:t>
+              <a:t>                                               Cleanup </a:t>
             </a:r>
             <a:endParaRPr lang="en-US" dirty="0" smtClean="0"/>
           </a:p>
@@ -9658,15 +9574,7 @@
           <a:p>
             <a:r>
               <a:rPr lang="en-US" b="1" dirty="0" smtClean="0"/>
-              <a:t>             </a:t>
-            </a:r>
-            <a:r>
-              <a:rPr lang="en-US" b="1" dirty="0" smtClean="0"/>
-              <a:t>                  The </a:t>
-            </a:r>
-            <a:r>
-              <a:rPr lang="en-US" b="1" dirty="0" smtClean="0"/>
-              <a:t>Page Header</a:t>
+              <a:t>                               The Page Header</a:t>
             </a:r>
             <a:endParaRPr lang="en-US" dirty="0" smtClean="0"/>
           </a:p>
@@ -10481,15 +10389,7 @@
           <a:p>
             <a:r>
               <a:rPr lang="en-US" b="1" dirty="0" smtClean="0"/>
-              <a:t>              </a:t>
-            </a:r>
-            <a:r>
-              <a:rPr lang="en-US" b="1" dirty="0" smtClean="0"/>
-              <a:t>                     The </a:t>
-            </a:r>
-            <a:r>
-              <a:rPr lang="en-US" b="1" dirty="0" smtClean="0"/>
-              <a:t>Page Class</a:t>
+              <a:t>                                   The Page Class</a:t>
             </a:r>
             <a:endParaRPr lang="en-US" dirty="0" smtClean="0"/>
           </a:p>
@@ -11774,15 +11674,7 @@
           <a:p>
             <a:r>
               <a:rPr lang="en-US" b="1" dirty="0" smtClean="0"/>
-              <a:t>          </a:t>
-            </a:r>
-            <a:r>
-              <a:rPr lang="en-US" b="1" dirty="0" smtClean="0"/>
-              <a:t>                        </a:t>
-            </a:r>
-            <a:r>
-              <a:rPr lang="en-US" b="1" dirty="0" smtClean="0"/>
-              <a:t>Request Object</a:t>
+              <a:t>                                  Request Object</a:t>
             </a:r>
             <a:endParaRPr lang="en-US" dirty="0" smtClean="0"/>
           </a:p>
@@ -11985,15 +11877,7 @@
           <a:p>
             <a:r>
               <a:rPr lang="en-US" b="1" dirty="0" smtClean="0"/>
-              <a:t>              </a:t>
-            </a:r>
-            <a:r>
-              <a:rPr lang="en-US" b="1" dirty="0" smtClean="0"/>
-              <a:t>                          HTML </a:t>
-            </a:r>
-            <a:r>
-              <a:rPr lang="en-US" b="1" dirty="0" smtClean="0"/>
-              <a:t>Forms</a:t>
+              <a:t>                                        HTML Forms</a:t>
             </a:r>
             <a:endParaRPr lang="en-US" dirty="0" smtClean="0"/>
           </a:p>
@@ -12210,15 +12094,7 @@
           <a:p>
             <a:r>
               <a:rPr lang="en-US" b="1" dirty="0" smtClean="0"/>
-              <a:t>      </a:t>
-            </a:r>
-            <a:r>
-              <a:rPr lang="en-US" b="1" dirty="0" smtClean="0"/>
-              <a:t>                   </a:t>
-            </a:r>
-            <a:r>
-              <a:rPr lang="en-US" b="1" dirty="0" smtClean="0"/>
-              <a:t>Request Object cont..</a:t>
+              <a:t>                         Request Object cont..</a:t>
             </a:r>
             <a:endParaRPr lang="en-US" dirty="0" smtClean="0"/>
           </a:p>
@@ -12688,15 +12564,7 @@
           <a:p>
             <a:r>
               <a:rPr lang="en-US" b="1" dirty="0" smtClean="0"/>
-              <a:t>    </a:t>
-            </a:r>
-            <a:r>
-              <a:rPr lang="en-US" b="1" dirty="0" smtClean="0"/>
-              <a:t>                   </a:t>
-            </a:r>
-            <a:r>
-              <a:rPr lang="en-US" b="1" dirty="0" smtClean="0"/>
-              <a:t>Request Object cont..</a:t>
+              <a:t>                       Request Object cont..</a:t>
             </a:r>
             <a:endParaRPr lang="en-US" dirty="0" smtClean="0"/>
           </a:p>
@@ -13122,15 +12990,7 @@
           <a:p>
             <a:r>
               <a:rPr lang="en-US" b="1" dirty="0" smtClean="0"/>
-              <a:t>           </a:t>
-            </a:r>
-            <a:r>
-              <a:rPr lang="en-US" b="1" dirty="0" smtClean="0"/>
-              <a:t>             Request </a:t>
-            </a:r>
-            <a:r>
-              <a:rPr lang="en-US" b="1" dirty="0" smtClean="0"/>
-              <a:t>Object cont..</a:t>
+              <a:t>                        Request Object cont..</a:t>
             </a:r>
             <a:endParaRPr lang="en-US" dirty="0" smtClean="0"/>
           </a:p>
@@ -13514,15 +13374,7 @@
           <a:p>
             <a:r>
               <a:rPr lang="en-US" b="1" dirty="0" smtClean="0"/>
-              <a:t>             </a:t>
-            </a:r>
-            <a:r>
-              <a:rPr lang="en-US" b="1" dirty="0" smtClean="0"/>
-              <a:t>                   Response </a:t>
-            </a:r>
-            <a:r>
-              <a:rPr lang="en-US" b="1" dirty="0" smtClean="0"/>
-              <a:t>object</a:t>
+              <a:t>                                Response object</a:t>
             </a:r>
             <a:endParaRPr lang="en-US" dirty="0" smtClean="0"/>
           </a:p>
@@ -13686,15 +13538,7 @@
           <a:p>
             <a:r>
               <a:rPr lang="en-US" b="1" dirty="0" smtClean="0"/>
-              <a:t>         </a:t>
-            </a:r>
-            <a:r>
-              <a:rPr lang="en-US" b="1" dirty="0" smtClean="0"/>
-              <a:t>             </a:t>
-            </a:r>
-            <a:r>
-              <a:rPr lang="en-US" b="1" dirty="0" smtClean="0"/>
-              <a:t>Response object cont..</a:t>
+              <a:t>                      Response object cont..</a:t>
             </a:r>
             <a:endParaRPr lang="en-US" dirty="0" smtClean="0"/>
           </a:p>
@@ -14260,1596 +14104,6 @@
 </p:sld>
 </file>
 
-<file path=ppt/slides/slide35.xml><?xml version="1.0" encoding="utf-8"?>
-<p:sld xmlns:a="http://schemas.openxmlformats.org/drawingml/2006/main" xmlns:r="http://schemas.openxmlformats.org/officeDocument/2006/relationships" xmlns:p="http://schemas.openxmlformats.org/presentationml/2006/main">
-  <p:cSld>
-    <p:spTree>
-      <p:nvGrpSpPr>
-        <p:cNvPr id="1" name=""/>
-        <p:cNvGrpSpPr/>
-        <p:nvPr/>
-      </p:nvGrpSpPr>
-      <p:grpSpPr>
-        <a:xfrm>
-          <a:off x="0" y="0"/>
-          <a:ext cx="0" cy="0"/>
-          <a:chOff x="0" y="0"/>
-          <a:chExt cx="0" cy="0"/>
-        </a:xfrm>
-      </p:grpSpPr>
-      <p:sp>
-        <p:nvSpPr>
-          <p:cNvPr id="54274" name="Title 1"/>
-          <p:cNvSpPr>
-            <a:spLocks noGrp="1"/>
-          </p:cNvSpPr>
-          <p:nvPr>
-            <p:ph type="title"/>
-          </p:nvPr>
-        </p:nvSpPr>
-        <p:spPr>
-          <a:xfrm>
-            <a:off x="0" y="0"/>
-            <a:ext cx="9144000" cy="1143000"/>
-          </a:xfrm>
-          <a:gradFill rotWithShape="0">
-            <a:lin/>
-          </a:gradFill>
-        </p:spPr>
-        <p:txBody>
-          <a:bodyPr/>
-          <a:lstStyle/>
-          <a:p>
-            <a:r>
-              <a:rPr lang="en-US" b="1" dirty="0" smtClean="0"/>
-              <a:t>                                     Server </a:t>
-            </a:r>
-            <a:r>
-              <a:rPr lang="en-US" b="1" dirty="0" smtClean="0"/>
-              <a:t>Object</a:t>
-            </a:r>
-            <a:endParaRPr lang="en-US" dirty="0" smtClean="0"/>
-          </a:p>
-        </p:txBody>
-      </p:sp>
-      <p:sp>
-        <p:nvSpPr>
-          <p:cNvPr id="54275" name="Slide Number Placeholder 2"/>
-          <p:cNvSpPr>
-            <a:spLocks noGrp="1"/>
-          </p:cNvSpPr>
-          <p:nvPr>
-            <p:ph type="sldNum" sz="quarter" idx="10"/>
-          </p:nvPr>
-        </p:nvSpPr>
-        <p:spPr bwMode="auto">
-          <a:noFill/>
-          <a:ln>
-            <a:miter lim="800000"/>
-            <a:headEnd/>
-            <a:tailEnd/>
-          </a:ln>
-        </p:spPr>
-        <p:txBody>
-          <a:bodyPr vert="horz" wrap="square" lIns="91440" tIns="45720" rIns="91440" bIns="45720" numCol="1" anchor="t" anchorCtr="0" compatLnSpc="1">
-            <a:prstTxWarp prst="textNoShape">
-              <a:avLst/>
-            </a:prstTxWarp>
-          </a:bodyPr>
-          <a:lstStyle/>
-          <a:p>
-            <a:fld id="{A1441F07-62DD-46B0-8311-3CA95226844C}" type="slidenum">
-              <a:rPr lang="en-US" smtClean="0"/>
-              <a:pPr/>
-              <a:t>35</a:t>
-            </a:fld>
-            <a:endParaRPr lang="en-US" smtClean="0"/>
-          </a:p>
-        </p:txBody>
-      </p:sp>
-      <p:sp>
-        <p:nvSpPr>
-          <p:cNvPr id="54276" name="Rectangle 3"/>
-          <p:cNvSpPr>
-            <a:spLocks noChangeArrowheads="1"/>
-          </p:cNvSpPr>
-          <p:nvPr/>
-        </p:nvSpPr>
-        <p:spPr bwMode="auto">
-          <a:xfrm>
-            <a:off x="0" y="1066800"/>
-            <a:ext cx="8839200" cy="893762"/>
-          </a:xfrm>
-          <a:prstGeom prst="rect">
-            <a:avLst/>
-          </a:prstGeom>
-          <a:noFill/>
-          <a:ln w="9525">
-            <a:noFill/>
-            <a:miter lim="800000"/>
-            <a:headEnd/>
-            <a:tailEnd/>
-          </a:ln>
-        </p:spPr>
-        <p:txBody>
-          <a:bodyPr>
-            <a:spAutoFit/>
-          </a:bodyPr>
-          <a:lstStyle/>
-          <a:p>
-            <a:r>
-              <a:rPr lang="en-US" sz="2600" b="1" dirty="0">
-                <a:solidFill>
-                  <a:srgbClr val="0070C0"/>
-                </a:solidFill>
-              </a:rPr>
-              <a:t>Server object is an instance of the </a:t>
-            </a:r>
-            <a:r>
-              <a:rPr lang="en-US" sz="2600" b="1" dirty="0" err="1">
-                <a:solidFill>
-                  <a:srgbClr val="0070C0"/>
-                </a:solidFill>
-              </a:rPr>
-              <a:t>System.Web.HttpServerUtility</a:t>
-            </a:r>
-            <a:r>
-              <a:rPr lang="en-US" sz="2600" b="1" dirty="0">
-                <a:solidFill>
-                  <a:srgbClr val="0070C0"/>
-                </a:solidFill>
-              </a:rPr>
-              <a:t> class.</a:t>
-            </a:r>
-          </a:p>
-        </p:txBody>
-      </p:sp>
-      <p:graphicFrame>
-        <p:nvGraphicFramePr>
-          <p:cNvPr id="5" name="Table 4"/>
-          <p:cNvGraphicFramePr>
-            <a:graphicFrameLocks noGrp="1"/>
-          </p:cNvGraphicFramePr>
-          <p:nvPr/>
-        </p:nvGraphicFramePr>
-        <p:xfrm>
-          <a:off x="0" y="2011680"/>
-          <a:ext cx="8840490" cy="4846320"/>
-        </p:xfrm>
-        <a:graphic>
-          <a:graphicData uri="http://schemas.openxmlformats.org/drawingml/2006/table">
-            <a:tbl>
-              <a:tblPr firstRow="1" bandRow="1">
-                <a:tableStyleId>{5C22544A-7EE6-4342-B048-85BDC9FD1C3A}</a:tableStyleId>
-              </a:tblPr>
-              <a:tblGrid>
-                <a:gridCol w="2604787"/>
-                <a:gridCol w="6235703"/>
-              </a:tblGrid>
-              <a:tr h="121285">
-                <a:tc>
-                  <a:txBody>
-                    <a:bodyPr/>
-                    <a:lstStyle/>
-                    <a:p>
-                      <a:pPr algn="ctr"/>
-                      <a:r>
-                        <a:rPr lang="en-US" sz="2800" b="1" kern="1200" baseline="0" dirty="0" smtClean="0">
-                          <a:solidFill>
-                            <a:schemeClr val="lt1"/>
-                          </a:solidFill>
-                          <a:latin typeface="+mn-lt"/>
-                          <a:ea typeface="+mn-ea"/>
-                          <a:cs typeface="+mn-cs"/>
-                        </a:rPr>
-                        <a:t>Member</a:t>
-                      </a:r>
-                      <a:endParaRPr lang="en-US" sz="2800" b="1" dirty="0"/>
-                    </a:p>
-                  </a:txBody>
-                  <a:tcPr/>
-                </a:tc>
-                <a:tc>
-                  <a:txBody>
-                    <a:bodyPr/>
-                    <a:lstStyle/>
-                    <a:p>
-                      <a:pPr algn="ctr"/>
-                      <a:r>
-                        <a:rPr lang="en-US" sz="2400" b="1" dirty="0" smtClean="0"/>
-                        <a:t>Description</a:t>
-                      </a:r>
-                      <a:endParaRPr lang="en-US" sz="2400" b="1" dirty="0"/>
-                    </a:p>
-                  </a:txBody>
-                  <a:tcPr/>
-                </a:tc>
-              </a:tr>
-              <a:tr h="349724">
-                <a:tc>
-                  <a:txBody>
-                    <a:bodyPr/>
-                    <a:lstStyle/>
-                    <a:p>
-                      <a:r>
-                        <a:rPr lang="en-US" sz="2600" kern="1200" baseline="0" dirty="0" err="1" smtClean="0">
-                          <a:solidFill>
-                            <a:schemeClr val="dk1"/>
-                          </a:solidFill>
-                          <a:latin typeface="+mn-lt"/>
-                          <a:ea typeface="+mn-ea"/>
-                          <a:cs typeface="+mn-cs"/>
-                        </a:rPr>
-                        <a:t>MachineName</a:t>
-                      </a:r>
-                      <a:endParaRPr lang="en-US" sz="2600" dirty="0"/>
-                    </a:p>
-                  </a:txBody>
-                  <a:tcPr/>
-                </a:tc>
-                <a:tc>
-                  <a:txBody>
-                    <a:bodyPr/>
-                    <a:lstStyle/>
-                    <a:p>
-                      <a:r>
-                        <a:rPr lang="en-US" sz="2600" kern="1200" baseline="0" dirty="0" smtClean="0">
-                          <a:solidFill>
-                            <a:schemeClr val="dk1"/>
-                          </a:solidFill>
-                          <a:latin typeface="+mn-lt"/>
-                          <a:ea typeface="+mn-ea"/>
-                          <a:cs typeface="+mn-cs"/>
-                        </a:rPr>
-                        <a:t>Computer name of the computer on which the page is running.</a:t>
-                      </a:r>
-                      <a:endParaRPr lang="en-US" sz="2600" dirty="0"/>
-                    </a:p>
-                  </a:txBody>
-                  <a:tcPr/>
-                </a:tc>
-              </a:tr>
-              <a:tr h="618743">
-                <a:tc>
-                  <a:txBody>
-                    <a:bodyPr/>
-                    <a:lstStyle/>
-                    <a:p>
-                      <a:r>
-                        <a:rPr lang="en-US" sz="2600" kern="1200" baseline="0" dirty="0" err="1" smtClean="0">
-                          <a:solidFill>
-                            <a:schemeClr val="dk1"/>
-                          </a:solidFill>
-                          <a:latin typeface="+mn-lt"/>
-                          <a:ea typeface="+mn-ea"/>
-                          <a:cs typeface="+mn-cs"/>
-                        </a:rPr>
-                        <a:t>GetLastError</a:t>
-                      </a:r>
-                      <a:r>
-                        <a:rPr lang="en-US" sz="2600" kern="1200" baseline="0" dirty="0" smtClean="0">
-                          <a:solidFill>
-                            <a:schemeClr val="dk1"/>
-                          </a:solidFill>
-                          <a:latin typeface="+mn-lt"/>
-                          <a:ea typeface="+mn-ea"/>
-                          <a:cs typeface="+mn-cs"/>
-                        </a:rPr>
-                        <a:t>()</a:t>
-                      </a:r>
-                      <a:endParaRPr lang="en-US" sz="2600" dirty="0"/>
-                    </a:p>
-                  </a:txBody>
-                  <a:tcPr/>
-                </a:tc>
-                <a:tc>
-                  <a:txBody>
-                    <a:bodyPr/>
-                    <a:lstStyle/>
-                    <a:p>
-                      <a:r>
-                        <a:rPr lang="en-US" sz="2600" kern="1200" baseline="0" dirty="0" smtClean="0">
-                          <a:solidFill>
-                            <a:schemeClr val="dk1"/>
-                          </a:solidFill>
-                          <a:latin typeface="+mn-lt"/>
-                          <a:ea typeface="+mn-ea"/>
-                          <a:cs typeface="+mn-cs"/>
-                        </a:rPr>
-                        <a:t>Retrieves the exception object for the most recently encountered error.</a:t>
-                      </a:r>
-                      <a:endParaRPr lang="en-US" sz="2600" dirty="0"/>
-                    </a:p>
-                  </a:txBody>
-                  <a:tcPr/>
-                </a:tc>
-              </a:tr>
-              <a:tr h="349724">
-                <a:tc>
-                  <a:txBody>
-                    <a:bodyPr/>
-                    <a:lstStyle/>
-                    <a:p>
-                      <a:r>
-                        <a:rPr lang="en-US" sz="2600" kern="1200" baseline="0" dirty="0" err="1" smtClean="0">
-                          <a:solidFill>
-                            <a:schemeClr val="dk1"/>
-                          </a:solidFill>
-                          <a:latin typeface="+mn-lt"/>
-                          <a:ea typeface="+mn-ea"/>
-                          <a:cs typeface="+mn-cs"/>
-                        </a:rPr>
-                        <a:t>HtmlEncode</a:t>
-                      </a:r>
-                      <a:r>
-                        <a:rPr lang="en-US" sz="2600" kern="1200" baseline="0" dirty="0" smtClean="0">
-                          <a:solidFill>
-                            <a:schemeClr val="dk1"/>
-                          </a:solidFill>
-                          <a:latin typeface="+mn-lt"/>
-                          <a:ea typeface="+mn-ea"/>
-                          <a:cs typeface="+mn-cs"/>
-                        </a:rPr>
-                        <a:t>() and</a:t>
-                      </a:r>
-                    </a:p>
-                    <a:p>
-                      <a:r>
-                        <a:rPr lang="en-US" sz="2600" kern="1200" baseline="0" dirty="0" err="1" smtClean="0">
-                          <a:solidFill>
-                            <a:schemeClr val="dk1"/>
-                          </a:solidFill>
-                          <a:latin typeface="+mn-lt"/>
-                          <a:ea typeface="+mn-ea"/>
-                          <a:cs typeface="+mn-cs"/>
-                        </a:rPr>
-                        <a:t>HtmlDecode</a:t>
-                      </a:r>
-                      <a:r>
-                        <a:rPr lang="en-US" sz="2600" kern="1200" baseline="0" dirty="0" smtClean="0">
-                          <a:solidFill>
-                            <a:schemeClr val="dk1"/>
-                          </a:solidFill>
-                          <a:latin typeface="+mn-lt"/>
-                          <a:ea typeface="+mn-ea"/>
-                          <a:cs typeface="+mn-cs"/>
-                        </a:rPr>
-                        <a:t>()</a:t>
-                      </a:r>
-                      <a:endParaRPr lang="en-US" sz="2600" dirty="0"/>
-                    </a:p>
-                  </a:txBody>
-                  <a:tcPr/>
-                </a:tc>
-                <a:tc>
-                  <a:txBody>
-                    <a:bodyPr/>
-                    <a:lstStyle/>
-                    <a:p>
-                      <a:r>
-                        <a:rPr lang="en-US" sz="2600" kern="1200" baseline="0" dirty="0" smtClean="0">
-                          <a:solidFill>
-                            <a:schemeClr val="dk1"/>
-                          </a:solidFill>
-                          <a:latin typeface="+mn-lt"/>
-                          <a:ea typeface="+mn-ea"/>
-                          <a:cs typeface="+mn-cs"/>
-                        </a:rPr>
-                        <a:t>Changes an ordinary string into a string with legal HTML characters (and back again).</a:t>
-                      </a:r>
-                      <a:endParaRPr lang="en-US" sz="2600" dirty="0"/>
-                    </a:p>
-                  </a:txBody>
-                  <a:tcPr/>
-                </a:tc>
-              </a:tr>
-              <a:tr h="618743">
-                <a:tc>
-                  <a:txBody>
-                    <a:bodyPr/>
-                    <a:lstStyle/>
-                    <a:p>
-                      <a:r>
-                        <a:rPr lang="en-US" sz="2600" kern="1200" baseline="0" dirty="0" err="1" smtClean="0">
-                          <a:solidFill>
-                            <a:schemeClr val="dk1"/>
-                          </a:solidFill>
-                          <a:latin typeface="+mn-lt"/>
-                          <a:ea typeface="+mn-ea"/>
-                          <a:cs typeface="+mn-cs"/>
-                        </a:rPr>
-                        <a:t>UrlEncode</a:t>
-                      </a:r>
-                      <a:r>
-                        <a:rPr lang="en-US" sz="2600" kern="1200" baseline="0" dirty="0" smtClean="0">
-                          <a:solidFill>
-                            <a:schemeClr val="dk1"/>
-                          </a:solidFill>
-                          <a:latin typeface="+mn-lt"/>
-                          <a:ea typeface="+mn-ea"/>
-                          <a:cs typeface="+mn-cs"/>
-                        </a:rPr>
-                        <a:t>() and</a:t>
-                      </a:r>
-                    </a:p>
-                    <a:p>
-                      <a:r>
-                        <a:rPr lang="en-US" sz="2600" kern="1200" baseline="0" dirty="0" err="1" smtClean="0">
-                          <a:solidFill>
-                            <a:schemeClr val="dk1"/>
-                          </a:solidFill>
-                          <a:latin typeface="+mn-lt"/>
-                          <a:ea typeface="+mn-ea"/>
-                          <a:cs typeface="+mn-cs"/>
-                        </a:rPr>
-                        <a:t>UrlDecode</a:t>
-                      </a:r>
-                      <a:r>
-                        <a:rPr lang="en-US" sz="2600" kern="1200" baseline="0" dirty="0" smtClean="0">
-                          <a:solidFill>
-                            <a:schemeClr val="dk1"/>
-                          </a:solidFill>
-                          <a:latin typeface="+mn-lt"/>
-                          <a:ea typeface="+mn-ea"/>
-                          <a:cs typeface="+mn-cs"/>
-                        </a:rPr>
-                        <a:t>()</a:t>
-                      </a:r>
-                      <a:endParaRPr lang="en-US" sz="2600" dirty="0"/>
-                    </a:p>
-                  </a:txBody>
-                  <a:tcPr/>
-                </a:tc>
-                <a:tc>
-                  <a:txBody>
-                    <a:bodyPr/>
-                    <a:lstStyle/>
-                    <a:p>
-                      <a:r>
-                        <a:rPr lang="en-US" sz="2600" kern="1200" baseline="0" dirty="0" smtClean="0">
-                          <a:solidFill>
-                            <a:schemeClr val="dk1"/>
-                          </a:solidFill>
-                          <a:latin typeface="+mn-lt"/>
-                          <a:ea typeface="+mn-ea"/>
-                          <a:cs typeface="+mn-cs"/>
-                        </a:rPr>
-                        <a:t>Changes an ordinary string into a string with legal URL characters (and back again).</a:t>
-                      </a:r>
-                      <a:endParaRPr lang="en-US" sz="2600" dirty="0"/>
-                    </a:p>
-                  </a:txBody>
-                  <a:tcPr/>
-                </a:tc>
-              </a:tr>
-            </a:tbl>
-          </a:graphicData>
-        </a:graphic>
-      </p:graphicFrame>
-    </p:spTree>
-  </p:cSld>
-  <p:clrMapOvr>
-    <a:masterClrMapping/>
-  </p:clrMapOvr>
-</p:sld>
-</file>
-
-<file path=ppt/slides/slide36.xml><?xml version="1.0" encoding="utf-8"?>
-<p:sld xmlns:a="http://schemas.openxmlformats.org/drawingml/2006/main" xmlns:r="http://schemas.openxmlformats.org/officeDocument/2006/relationships" xmlns:p="http://schemas.openxmlformats.org/presentationml/2006/main">
-  <p:cSld>
-    <p:spTree>
-      <p:nvGrpSpPr>
-        <p:cNvPr id="1" name=""/>
-        <p:cNvGrpSpPr/>
-        <p:nvPr/>
-      </p:nvGrpSpPr>
-      <p:grpSpPr>
-        <a:xfrm>
-          <a:off x="0" y="0"/>
-          <a:ext cx="0" cy="0"/>
-          <a:chOff x="0" y="0"/>
-          <a:chExt cx="0" cy="0"/>
-        </a:xfrm>
-      </p:grpSpPr>
-      <p:sp>
-        <p:nvSpPr>
-          <p:cNvPr id="55298" name="Title 1"/>
-          <p:cNvSpPr>
-            <a:spLocks noGrp="1"/>
-          </p:cNvSpPr>
-          <p:nvPr>
-            <p:ph type="title"/>
-          </p:nvPr>
-        </p:nvSpPr>
-        <p:spPr>
-          <a:xfrm>
-            <a:off x="0" y="0"/>
-            <a:ext cx="9144000" cy="1143000"/>
-          </a:xfrm>
-          <a:gradFill rotWithShape="0">
-            <a:lin/>
-          </a:gradFill>
-        </p:spPr>
-        <p:txBody>
-          <a:bodyPr/>
-          <a:lstStyle/>
-          <a:p>
-            <a:r>
-              <a:rPr lang="en-US" b="1" dirty="0" smtClean="0"/>
-              <a:t>         </a:t>
-            </a:r>
-            <a:r>
-              <a:rPr lang="en-US" b="1" dirty="0" smtClean="0"/>
-              <a:t>                 Server </a:t>
-            </a:r>
-            <a:r>
-              <a:rPr lang="en-US" b="1" dirty="0" smtClean="0"/>
-              <a:t>Object cont..</a:t>
-            </a:r>
-            <a:endParaRPr lang="en-US" dirty="0" smtClean="0"/>
-          </a:p>
-        </p:txBody>
-      </p:sp>
-      <p:sp>
-        <p:nvSpPr>
-          <p:cNvPr id="55299" name="Slide Number Placeholder 2"/>
-          <p:cNvSpPr>
-            <a:spLocks noGrp="1"/>
-          </p:cNvSpPr>
-          <p:nvPr>
-            <p:ph type="sldNum" sz="quarter" idx="10"/>
-          </p:nvPr>
-        </p:nvSpPr>
-        <p:spPr bwMode="auto">
-          <a:noFill/>
-          <a:ln>
-            <a:miter lim="800000"/>
-            <a:headEnd/>
-            <a:tailEnd/>
-          </a:ln>
-        </p:spPr>
-        <p:txBody>
-          <a:bodyPr vert="horz" wrap="square" lIns="91440" tIns="45720" rIns="91440" bIns="45720" numCol="1" anchor="t" anchorCtr="0" compatLnSpc="1">
-            <a:prstTxWarp prst="textNoShape">
-              <a:avLst/>
-            </a:prstTxWarp>
-          </a:bodyPr>
-          <a:lstStyle/>
-          <a:p>
-            <a:fld id="{553F3526-9DCE-4C97-9169-6981EC744845}" type="slidenum">
-              <a:rPr lang="en-US" smtClean="0"/>
-              <a:pPr/>
-              <a:t>36</a:t>
-            </a:fld>
-            <a:endParaRPr lang="en-US" smtClean="0"/>
-          </a:p>
-        </p:txBody>
-      </p:sp>
-      <p:graphicFrame>
-        <p:nvGraphicFramePr>
-          <p:cNvPr id="4" name="Table 3"/>
-          <p:cNvGraphicFramePr>
-            <a:graphicFrameLocks noGrp="1"/>
-          </p:cNvGraphicFramePr>
-          <p:nvPr/>
-        </p:nvGraphicFramePr>
-        <p:xfrm>
-          <a:off x="303510" y="1600200"/>
-          <a:ext cx="8840490" cy="4632960"/>
-        </p:xfrm>
-        <a:graphic>
-          <a:graphicData uri="http://schemas.openxmlformats.org/drawingml/2006/table">
-            <a:tbl>
-              <a:tblPr firstRow="1" bandRow="1">
-                <a:tableStyleId>{5C22544A-7EE6-4342-B048-85BDC9FD1C3A}</a:tableStyleId>
-              </a:tblPr>
-              <a:tblGrid>
-                <a:gridCol w="2823270"/>
-                <a:gridCol w="6017220"/>
-              </a:tblGrid>
-              <a:tr h="492593">
-                <a:tc>
-                  <a:txBody>
-                    <a:bodyPr/>
-                    <a:lstStyle/>
-                    <a:p>
-                      <a:pPr algn="ctr"/>
-                      <a:r>
-                        <a:rPr lang="en-US" sz="2800" b="1" kern="1200" baseline="0" dirty="0" smtClean="0">
-                          <a:solidFill>
-                            <a:schemeClr val="lt1"/>
-                          </a:solidFill>
-                          <a:latin typeface="+mn-lt"/>
-                          <a:ea typeface="+mn-ea"/>
-                          <a:cs typeface="+mn-cs"/>
-                        </a:rPr>
-                        <a:t>Member</a:t>
-                      </a:r>
-                      <a:endParaRPr lang="en-US" sz="2800" b="1" dirty="0"/>
-                    </a:p>
-                  </a:txBody>
-                  <a:tcPr/>
-                </a:tc>
-                <a:tc>
-                  <a:txBody>
-                    <a:bodyPr/>
-                    <a:lstStyle/>
-                    <a:p>
-                      <a:pPr algn="ctr"/>
-                      <a:r>
-                        <a:rPr lang="en-US" sz="2400" b="1" dirty="0" smtClean="0"/>
-                        <a:t>Description</a:t>
-                      </a:r>
-                      <a:endParaRPr lang="en-US" sz="2400" b="1" dirty="0"/>
-                    </a:p>
-                  </a:txBody>
-                  <a:tcPr/>
-                </a:tc>
-              </a:tr>
-              <a:tr h="1709587">
-                <a:tc>
-                  <a:txBody>
-                    <a:bodyPr/>
-                    <a:lstStyle/>
-                    <a:p>
-                      <a:r>
-                        <a:rPr lang="en-US" sz="2800" kern="1200" baseline="0" dirty="0" err="1" smtClean="0">
-                          <a:solidFill>
-                            <a:schemeClr val="dk1"/>
-                          </a:solidFill>
-                          <a:latin typeface="+mn-lt"/>
-                          <a:ea typeface="+mn-ea"/>
-                          <a:cs typeface="+mn-cs"/>
-                        </a:rPr>
-                        <a:t>UrlTokenEncode</a:t>
-                      </a:r>
-                      <a:r>
-                        <a:rPr lang="en-US" sz="2800" kern="1200" baseline="0" dirty="0" smtClean="0">
-                          <a:solidFill>
-                            <a:schemeClr val="dk1"/>
-                          </a:solidFill>
-                          <a:latin typeface="+mn-lt"/>
-                          <a:ea typeface="+mn-ea"/>
-                          <a:cs typeface="+mn-cs"/>
-                        </a:rPr>
-                        <a:t>() and</a:t>
-                      </a:r>
-                    </a:p>
-                    <a:p>
-                      <a:r>
-                        <a:rPr lang="en-US" sz="2800" kern="1200" baseline="0" dirty="0" err="1" smtClean="0">
-                          <a:solidFill>
-                            <a:schemeClr val="dk1"/>
-                          </a:solidFill>
-                          <a:latin typeface="+mn-lt"/>
-                          <a:ea typeface="+mn-ea"/>
-                          <a:cs typeface="+mn-cs"/>
-                        </a:rPr>
-                        <a:t>UrlTokenDecode</a:t>
-                      </a:r>
-                      <a:r>
-                        <a:rPr lang="en-US" sz="2800" kern="1200" baseline="0" dirty="0" smtClean="0">
-                          <a:solidFill>
-                            <a:schemeClr val="dk1"/>
-                          </a:solidFill>
-                          <a:latin typeface="+mn-lt"/>
-                          <a:ea typeface="+mn-ea"/>
-                          <a:cs typeface="+mn-cs"/>
-                        </a:rPr>
-                        <a:t>()</a:t>
-                      </a:r>
-                      <a:endParaRPr lang="en-US" sz="2800" dirty="0"/>
-                    </a:p>
-                  </a:txBody>
-                  <a:tcPr/>
-                </a:tc>
-                <a:tc>
-                  <a:txBody>
-                    <a:bodyPr/>
-                    <a:lstStyle/>
-                    <a:p>
-                      <a:r>
-                        <a:rPr lang="en-US" sz="2800" kern="1200" baseline="0" dirty="0" smtClean="0">
-                          <a:solidFill>
-                            <a:schemeClr val="dk1"/>
-                          </a:solidFill>
-                          <a:latin typeface="+mn-lt"/>
-                          <a:ea typeface="+mn-ea"/>
-                          <a:cs typeface="+mn-cs"/>
-                        </a:rPr>
-                        <a:t>Performs the same work as </a:t>
-                      </a:r>
-                      <a:r>
-                        <a:rPr lang="en-US" sz="2800" kern="1200" baseline="0" dirty="0" err="1" smtClean="0">
-                          <a:solidFill>
-                            <a:schemeClr val="dk1"/>
-                          </a:solidFill>
-                          <a:latin typeface="+mn-lt"/>
-                          <a:ea typeface="+mn-ea"/>
-                          <a:cs typeface="+mn-cs"/>
-                        </a:rPr>
-                        <a:t>UrlEncode</a:t>
-                      </a:r>
-                      <a:r>
-                        <a:rPr lang="en-US" sz="2800" kern="1200" baseline="0" dirty="0" smtClean="0">
-                          <a:solidFill>
-                            <a:schemeClr val="dk1"/>
-                          </a:solidFill>
-                          <a:latin typeface="+mn-lt"/>
-                          <a:ea typeface="+mn-ea"/>
-                          <a:cs typeface="+mn-cs"/>
-                        </a:rPr>
-                        <a:t>() and </a:t>
-                      </a:r>
-                      <a:r>
-                        <a:rPr lang="en-US" sz="2800" kern="1200" baseline="0" dirty="0" err="1" smtClean="0">
-                          <a:solidFill>
-                            <a:schemeClr val="dk1"/>
-                          </a:solidFill>
-                          <a:latin typeface="+mn-lt"/>
-                          <a:ea typeface="+mn-ea"/>
-                          <a:cs typeface="+mn-cs"/>
-                        </a:rPr>
-                        <a:t>UrlDecode</a:t>
-                      </a:r>
-                      <a:r>
-                        <a:rPr lang="en-US" sz="2800" kern="1200" baseline="0" dirty="0" smtClean="0">
-                          <a:solidFill>
-                            <a:schemeClr val="dk1"/>
-                          </a:solidFill>
-                          <a:latin typeface="+mn-lt"/>
-                          <a:ea typeface="+mn-ea"/>
-                          <a:cs typeface="+mn-cs"/>
-                        </a:rPr>
-                        <a:t>(), except they work on a byte array that contains Base64-encoded data.</a:t>
-                      </a:r>
-                      <a:endParaRPr lang="en-US" sz="2800" dirty="0"/>
-                    </a:p>
-                  </a:txBody>
-                  <a:tcPr/>
-                </a:tc>
-              </a:tr>
-              <a:tr h="1303922">
-                <a:tc>
-                  <a:txBody>
-                    <a:bodyPr/>
-                    <a:lstStyle/>
-                    <a:p>
-                      <a:r>
-                        <a:rPr lang="en-US" sz="2800" kern="1200" baseline="0" dirty="0" err="1" smtClean="0">
-                          <a:solidFill>
-                            <a:schemeClr val="dk1"/>
-                          </a:solidFill>
-                          <a:latin typeface="+mn-lt"/>
-                          <a:ea typeface="+mn-ea"/>
-                          <a:cs typeface="+mn-cs"/>
-                        </a:rPr>
-                        <a:t>MapPath</a:t>
-                      </a:r>
-                      <a:r>
-                        <a:rPr lang="en-US" sz="2800" kern="1200" baseline="0" dirty="0" smtClean="0">
-                          <a:solidFill>
-                            <a:schemeClr val="dk1"/>
-                          </a:solidFill>
-                          <a:latin typeface="+mn-lt"/>
-                          <a:ea typeface="+mn-ea"/>
-                          <a:cs typeface="+mn-cs"/>
-                        </a:rPr>
-                        <a:t>()</a:t>
-                      </a:r>
-                      <a:endParaRPr lang="en-US" sz="2800" dirty="0"/>
-                    </a:p>
-                  </a:txBody>
-                  <a:tcPr/>
-                </a:tc>
-                <a:tc>
-                  <a:txBody>
-                    <a:bodyPr/>
-                    <a:lstStyle/>
-                    <a:p>
-                      <a:r>
-                        <a:rPr lang="en-US" sz="2800" kern="1200" baseline="0" dirty="0" smtClean="0">
-                          <a:solidFill>
-                            <a:schemeClr val="dk1"/>
-                          </a:solidFill>
-                          <a:latin typeface="+mn-lt"/>
-                          <a:ea typeface="+mn-ea"/>
-                          <a:cs typeface="+mn-cs"/>
-                        </a:rPr>
-                        <a:t>Returns the physical file path that corresponds to a specified virtual file path.</a:t>
-                      </a:r>
-                      <a:endParaRPr lang="en-US" sz="2800" dirty="0"/>
-                    </a:p>
-                  </a:txBody>
-                  <a:tcPr/>
-                </a:tc>
-              </a:tr>
-              <a:tr h="898258">
-                <a:tc>
-                  <a:txBody>
-                    <a:bodyPr/>
-                    <a:lstStyle/>
-                    <a:p>
-                      <a:r>
-                        <a:rPr lang="en-US" sz="2800" kern="1200" baseline="0" dirty="0" smtClean="0">
-                          <a:solidFill>
-                            <a:schemeClr val="dk1"/>
-                          </a:solidFill>
-                          <a:latin typeface="+mn-lt"/>
-                          <a:ea typeface="+mn-ea"/>
-                          <a:cs typeface="+mn-cs"/>
-                        </a:rPr>
-                        <a:t>Transfer()</a:t>
-                      </a:r>
-                      <a:endParaRPr lang="en-US" sz="2800" dirty="0"/>
-                    </a:p>
-                  </a:txBody>
-                  <a:tcPr/>
-                </a:tc>
-                <a:tc>
-                  <a:txBody>
-                    <a:bodyPr/>
-                    <a:lstStyle/>
-                    <a:p>
-                      <a:r>
-                        <a:rPr lang="en-US" sz="2800" kern="1200" baseline="0" dirty="0" smtClean="0">
-                          <a:solidFill>
-                            <a:schemeClr val="dk1"/>
-                          </a:solidFill>
-                          <a:latin typeface="+mn-lt"/>
-                          <a:ea typeface="+mn-ea"/>
-                          <a:cs typeface="+mn-cs"/>
-                        </a:rPr>
-                        <a:t>Transfers execution to another web page in the current application.</a:t>
-                      </a:r>
-                      <a:endParaRPr lang="en-US" sz="2800" dirty="0"/>
-                    </a:p>
-                  </a:txBody>
-                  <a:tcPr/>
-                </a:tc>
-              </a:tr>
-            </a:tbl>
-          </a:graphicData>
-        </a:graphic>
-      </p:graphicFrame>
-    </p:spTree>
-  </p:cSld>
-  <p:clrMapOvr>
-    <a:masterClrMapping/>
-  </p:clrMapOvr>
-</p:sld>
-</file>
-
-<file path=ppt/slides/slide37.xml><?xml version="1.0" encoding="utf-8"?>
-<p:sld xmlns:a="http://schemas.openxmlformats.org/drawingml/2006/main" xmlns:r="http://schemas.openxmlformats.org/officeDocument/2006/relationships" xmlns:p="http://schemas.openxmlformats.org/presentationml/2006/main">
-  <p:cSld>
-    <p:spTree>
-      <p:nvGrpSpPr>
-        <p:cNvPr id="1" name=""/>
-        <p:cNvGrpSpPr/>
-        <p:nvPr/>
-      </p:nvGrpSpPr>
-      <p:grpSpPr>
-        <a:xfrm>
-          <a:off x="0" y="0"/>
-          <a:ext cx="0" cy="0"/>
-          <a:chOff x="0" y="0"/>
-          <a:chExt cx="0" cy="0"/>
-        </a:xfrm>
-      </p:grpSpPr>
-      <p:sp>
-        <p:nvSpPr>
-          <p:cNvPr id="56322" name="Title 1"/>
-          <p:cNvSpPr>
-            <a:spLocks noGrp="1"/>
-          </p:cNvSpPr>
-          <p:nvPr>
-            <p:ph type="title"/>
-          </p:nvPr>
-        </p:nvSpPr>
-        <p:spPr>
-          <a:xfrm>
-            <a:off x="0" y="0"/>
-            <a:ext cx="9144000" cy="1143000"/>
-          </a:xfrm>
-          <a:gradFill rotWithShape="0">
-            <a:lin/>
-          </a:gradFill>
-        </p:spPr>
-        <p:txBody>
-          <a:bodyPr/>
-          <a:lstStyle/>
-          <a:p>
-            <a:r>
-              <a:rPr lang="en-US" i="1" dirty="0" smtClean="0"/>
-              <a:t>           </a:t>
-            </a:r>
-            <a:r>
-              <a:rPr lang="en-US" i="1" dirty="0" smtClean="0"/>
-              <a:t>         Common </a:t>
-            </a:r>
-            <a:r>
-              <a:rPr lang="en-US" i="1" dirty="0" smtClean="0"/>
-              <a:t>HTML Entities</a:t>
-            </a:r>
-            <a:endParaRPr lang="en-US" dirty="0" smtClean="0"/>
-          </a:p>
-        </p:txBody>
-      </p:sp>
-      <p:sp>
-        <p:nvSpPr>
-          <p:cNvPr id="56323" name="Slide Number Placeholder 2"/>
-          <p:cNvSpPr>
-            <a:spLocks noGrp="1"/>
-          </p:cNvSpPr>
-          <p:nvPr>
-            <p:ph type="sldNum" sz="quarter" idx="10"/>
-          </p:nvPr>
-        </p:nvSpPr>
-        <p:spPr bwMode="auto">
-          <a:noFill/>
-          <a:ln>
-            <a:miter lim="800000"/>
-            <a:headEnd/>
-            <a:tailEnd/>
-          </a:ln>
-        </p:spPr>
-        <p:txBody>
-          <a:bodyPr vert="horz" wrap="square" lIns="91440" tIns="45720" rIns="91440" bIns="45720" numCol="1" anchor="t" anchorCtr="0" compatLnSpc="1">
-            <a:prstTxWarp prst="textNoShape">
-              <a:avLst/>
-            </a:prstTxWarp>
-          </a:bodyPr>
-          <a:lstStyle/>
-          <a:p>
-            <a:fld id="{025F6B81-DCCE-485F-AF3E-935470DAB958}" type="slidenum">
-              <a:rPr lang="en-US" smtClean="0"/>
-              <a:pPr/>
-              <a:t>37</a:t>
-            </a:fld>
-            <a:endParaRPr lang="en-US" smtClean="0"/>
-          </a:p>
-        </p:txBody>
-      </p:sp>
-      <p:graphicFrame>
-        <p:nvGraphicFramePr>
-          <p:cNvPr id="4" name="Table 3"/>
-          <p:cNvGraphicFramePr>
-            <a:graphicFrameLocks noGrp="1"/>
-          </p:cNvGraphicFramePr>
-          <p:nvPr/>
-        </p:nvGraphicFramePr>
-        <p:xfrm>
-          <a:off x="120650" y="1828800"/>
-          <a:ext cx="8840491" cy="4194046"/>
-        </p:xfrm>
-        <a:graphic>
-          <a:graphicData uri="http://schemas.openxmlformats.org/drawingml/2006/table">
-            <a:tbl>
-              <a:tblPr firstRow="1" bandRow="1">
-                <a:tableStyleId>{5C22544A-7EE6-4342-B048-85BDC9FD1C3A}</a:tableStyleId>
-              </a:tblPr>
-              <a:tblGrid>
-                <a:gridCol w="1679875"/>
-                <a:gridCol w="4343100"/>
-                <a:gridCol w="2817516"/>
-              </a:tblGrid>
-              <a:tr h="362585">
-                <a:tc>
-                  <a:txBody>
-                    <a:bodyPr/>
-                    <a:lstStyle/>
-                    <a:p>
-                      <a:pPr algn="ctr"/>
-                      <a:r>
-                        <a:rPr lang="en-US" sz="3400" b="1" kern="1200" baseline="0" dirty="0" smtClean="0">
-                          <a:solidFill>
-                            <a:schemeClr val="lt1"/>
-                          </a:solidFill>
-                          <a:latin typeface="+mn-lt"/>
-                          <a:ea typeface="+mn-ea"/>
-                          <a:cs typeface="+mn-cs"/>
-                        </a:rPr>
-                        <a:t>Result</a:t>
-                      </a:r>
-                      <a:endParaRPr lang="en-US" sz="3400" b="1" dirty="0"/>
-                    </a:p>
-                  </a:txBody>
-                  <a:tcPr/>
-                </a:tc>
-                <a:tc>
-                  <a:txBody>
-                    <a:bodyPr/>
-                    <a:lstStyle/>
-                    <a:p>
-                      <a:pPr algn="ctr"/>
-                      <a:r>
-                        <a:rPr lang="en-US" sz="3400" b="1" kern="1200" baseline="0" dirty="0" smtClean="0">
-                          <a:solidFill>
-                            <a:schemeClr val="lt1"/>
-                          </a:solidFill>
-                          <a:latin typeface="+mn-lt"/>
-                          <a:ea typeface="+mn-ea"/>
-                          <a:cs typeface="+mn-cs"/>
-                        </a:rPr>
-                        <a:t>Description</a:t>
-                      </a:r>
-                      <a:endParaRPr lang="en-US" sz="3400" b="1" dirty="0"/>
-                    </a:p>
-                  </a:txBody>
-                  <a:tcPr/>
-                </a:tc>
-                <a:tc>
-                  <a:txBody>
-                    <a:bodyPr/>
-                    <a:lstStyle/>
-                    <a:p>
-                      <a:pPr algn="ctr"/>
-                      <a:r>
-                        <a:rPr lang="en-US" sz="3400" b="1" kern="1200" baseline="0" dirty="0" smtClean="0">
-                          <a:solidFill>
-                            <a:schemeClr val="lt1"/>
-                          </a:solidFill>
-                          <a:latin typeface="+mn-lt"/>
-                          <a:ea typeface="+mn-ea"/>
-                          <a:cs typeface="+mn-cs"/>
-                        </a:rPr>
-                        <a:t>Encoded Entity</a:t>
-                      </a:r>
-                      <a:endParaRPr lang="en-US" sz="3400" b="1" dirty="0"/>
-                    </a:p>
-                  </a:txBody>
-                  <a:tcPr/>
-                </a:tc>
-              </a:tr>
-              <a:tr h="618743">
-                <a:tc>
-                  <a:txBody>
-                    <a:bodyPr/>
-                    <a:lstStyle/>
-                    <a:p>
-                      <a:pPr algn="ctr"/>
-                      <a:endParaRPr lang="en-US" sz="3400" dirty="0"/>
-                    </a:p>
-                  </a:txBody>
-                  <a:tcPr/>
-                </a:tc>
-                <a:tc>
-                  <a:txBody>
-                    <a:bodyPr/>
-                    <a:lstStyle/>
-                    <a:p>
-                      <a:r>
-                        <a:rPr lang="en-US" sz="3400" kern="1200" baseline="0" dirty="0" smtClean="0">
-                          <a:solidFill>
-                            <a:schemeClr val="dk1"/>
-                          </a:solidFill>
-                          <a:latin typeface="+mn-lt"/>
-                          <a:ea typeface="+mn-ea"/>
-                          <a:cs typeface="+mn-cs"/>
-                        </a:rPr>
-                        <a:t>Non breaking space</a:t>
-                      </a:r>
-                      <a:endParaRPr lang="en-US" sz="3400" dirty="0"/>
-                    </a:p>
-                  </a:txBody>
-                  <a:tcPr/>
-                </a:tc>
-                <a:tc>
-                  <a:txBody>
-                    <a:bodyPr/>
-                    <a:lstStyle/>
-                    <a:p>
-                      <a:pPr algn="ctr"/>
-                      <a:r>
-                        <a:rPr lang="en-US" sz="3400" kern="1200" baseline="0" dirty="0" smtClean="0">
-                          <a:solidFill>
-                            <a:schemeClr val="dk1"/>
-                          </a:solidFill>
-                          <a:latin typeface="+mn-lt"/>
-                          <a:ea typeface="+mn-ea"/>
-                          <a:cs typeface="+mn-cs"/>
-                        </a:rPr>
-                        <a:t>&amp;</a:t>
-                      </a:r>
-                      <a:r>
-                        <a:rPr lang="en-US" sz="3400" kern="1200" baseline="0" dirty="0" err="1" smtClean="0">
-                          <a:solidFill>
-                            <a:schemeClr val="dk1"/>
-                          </a:solidFill>
-                          <a:latin typeface="+mn-lt"/>
-                          <a:ea typeface="+mn-ea"/>
-                          <a:cs typeface="+mn-cs"/>
-                        </a:rPr>
-                        <a:t>nbsp</a:t>
-                      </a:r>
-                      <a:r>
-                        <a:rPr lang="en-US" sz="3400" kern="1200" baseline="0" dirty="0" smtClean="0">
-                          <a:solidFill>
-                            <a:schemeClr val="dk1"/>
-                          </a:solidFill>
-                          <a:latin typeface="+mn-lt"/>
-                          <a:ea typeface="+mn-ea"/>
-                          <a:cs typeface="+mn-cs"/>
-                        </a:rPr>
-                        <a:t>;</a:t>
-                      </a:r>
-                      <a:endParaRPr lang="en-US" sz="3400" dirty="0"/>
-                    </a:p>
-                  </a:txBody>
-                  <a:tcPr/>
-                </a:tc>
-              </a:tr>
-              <a:tr h="618743">
-                <a:tc>
-                  <a:txBody>
-                    <a:bodyPr/>
-                    <a:lstStyle/>
-                    <a:p>
-                      <a:pPr algn="ctr"/>
-                      <a:r>
-                        <a:rPr lang="en-US" sz="3400" kern="1200" baseline="0" dirty="0" smtClean="0">
-                          <a:solidFill>
-                            <a:schemeClr val="dk1"/>
-                          </a:solidFill>
-                          <a:latin typeface="+mn-lt"/>
-                          <a:ea typeface="+mn-ea"/>
-                          <a:cs typeface="+mn-cs"/>
-                        </a:rPr>
-                        <a:t>&lt;</a:t>
-                      </a:r>
-                      <a:endParaRPr lang="en-US" sz="3400" dirty="0"/>
-                    </a:p>
-                  </a:txBody>
-                  <a:tcPr/>
-                </a:tc>
-                <a:tc>
-                  <a:txBody>
-                    <a:bodyPr/>
-                    <a:lstStyle/>
-                    <a:p>
-                      <a:r>
-                        <a:rPr lang="en-US" sz="3400" kern="1200" baseline="0" dirty="0" smtClean="0">
-                          <a:solidFill>
-                            <a:schemeClr val="dk1"/>
-                          </a:solidFill>
-                          <a:latin typeface="+mn-lt"/>
-                          <a:ea typeface="+mn-ea"/>
-                          <a:cs typeface="+mn-cs"/>
-                        </a:rPr>
-                        <a:t>Less-than symbol</a:t>
-                      </a:r>
-                      <a:endParaRPr lang="en-US" sz="3400" dirty="0"/>
-                    </a:p>
-                  </a:txBody>
-                  <a:tcPr/>
-                </a:tc>
-                <a:tc>
-                  <a:txBody>
-                    <a:bodyPr/>
-                    <a:lstStyle/>
-                    <a:p>
-                      <a:pPr algn="ctr"/>
-                      <a:r>
-                        <a:rPr lang="en-US" sz="3400" kern="1200" baseline="0" dirty="0" smtClean="0">
-                          <a:solidFill>
-                            <a:schemeClr val="dk1"/>
-                          </a:solidFill>
-                          <a:latin typeface="+mn-lt"/>
-                          <a:ea typeface="+mn-ea"/>
-                          <a:cs typeface="+mn-cs"/>
-                        </a:rPr>
-                        <a:t>&amp;</a:t>
-                      </a:r>
-                      <a:r>
-                        <a:rPr lang="en-US" sz="3400" kern="1200" baseline="0" dirty="0" err="1" smtClean="0">
-                          <a:solidFill>
-                            <a:schemeClr val="dk1"/>
-                          </a:solidFill>
-                          <a:latin typeface="+mn-lt"/>
-                          <a:ea typeface="+mn-ea"/>
-                          <a:cs typeface="+mn-cs"/>
-                        </a:rPr>
-                        <a:t>lt</a:t>
-                      </a:r>
-                      <a:r>
-                        <a:rPr lang="en-US" sz="3400" kern="1200" baseline="0" dirty="0" smtClean="0">
-                          <a:solidFill>
-                            <a:schemeClr val="dk1"/>
-                          </a:solidFill>
-                          <a:latin typeface="+mn-lt"/>
-                          <a:ea typeface="+mn-ea"/>
-                          <a:cs typeface="+mn-cs"/>
-                        </a:rPr>
-                        <a:t>;</a:t>
-                      </a:r>
-                      <a:endParaRPr lang="en-US" sz="3400" dirty="0"/>
-                    </a:p>
-                  </a:txBody>
-                  <a:tcPr/>
-                </a:tc>
-              </a:tr>
-              <a:tr h="447979">
-                <a:tc>
-                  <a:txBody>
-                    <a:bodyPr/>
-                    <a:lstStyle/>
-                    <a:p>
-                      <a:pPr algn="ctr"/>
-                      <a:r>
-                        <a:rPr lang="en-US" sz="3400" kern="1200" baseline="0" dirty="0" smtClean="0">
-                          <a:solidFill>
-                            <a:schemeClr val="dk1"/>
-                          </a:solidFill>
-                          <a:latin typeface="+mn-lt"/>
-                          <a:ea typeface="+mn-ea"/>
-                          <a:cs typeface="+mn-cs"/>
-                        </a:rPr>
-                        <a:t>&gt;</a:t>
-                      </a:r>
-                      <a:endParaRPr lang="en-US" sz="3400" dirty="0"/>
-                    </a:p>
-                  </a:txBody>
-                  <a:tcPr/>
-                </a:tc>
-                <a:tc>
-                  <a:txBody>
-                    <a:bodyPr/>
-                    <a:lstStyle/>
-                    <a:p>
-                      <a:r>
-                        <a:rPr lang="en-US" sz="3400" kern="1200" baseline="0" dirty="0" smtClean="0">
-                          <a:solidFill>
-                            <a:schemeClr val="dk1"/>
-                          </a:solidFill>
-                          <a:latin typeface="+mn-lt"/>
-                          <a:ea typeface="+mn-ea"/>
-                          <a:cs typeface="+mn-cs"/>
-                        </a:rPr>
-                        <a:t>Greater-than symbol</a:t>
-                      </a:r>
-                      <a:endParaRPr lang="en-US" sz="3400" dirty="0"/>
-                    </a:p>
-                  </a:txBody>
-                  <a:tcPr/>
-                </a:tc>
-                <a:tc>
-                  <a:txBody>
-                    <a:bodyPr/>
-                    <a:lstStyle/>
-                    <a:p>
-                      <a:pPr algn="ctr"/>
-                      <a:r>
-                        <a:rPr lang="en-US" sz="3400" kern="1200" baseline="0" dirty="0" smtClean="0">
-                          <a:solidFill>
-                            <a:schemeClr val="dk1"/>
-                          </a:solidFill>
-                          <a:latin typeface="+mn-lt"/>
-                          <a:ea typeface="+mn-ea"/>
-                          <a:cs typeface="+mn-cs"/>
-                        </a:rPr>
-                        <a:t>&amp;</a:t>
-                      </a:r>
-                      <a:r>
-                        <a:rPr lang="en-US" sz="3400" kern="1200" baseline="0" dirty="0" err="1" smtClean="0">
-                          <a:solidFill>
-                            <a:schemeClr val="dk1"/>
-                          </a:solidFill>
-                          <a:latin typeface="+mn-lt"/>
-                          <a:ea typeface="+mn-ea"/>
-                          <a:cs typeface="+mn-cs"/>
-                        </a:rPr>
-                        <a:t>gt</a:t>
-                      </a:r>
-                      <a:r>
-                        <a:rPr lang="en-US" sz="3400" kern="1200" baseline="0" dirty="0" smtClean="0">
-                          <a:solidFill>
-                            <a:schemeClr val="dk1"/>
-                          </a:solidFill>
-                          <a:latin typeface="+mn-lt"/>
-                          <a:ea typeface="+mn-ea"/>
-                          <a:cs typeface="+mn-cs"/>
-                        </a:rPr>
-                        <a:t>;</a:t>
-                      </a:r>
-                      <a:endParaRPr lang="en-US" sz="3400" dirty="0"/>
-                    </a:p>
-                  </a:txBody>
-                  <a:tcPr/>
-                </a:tc>
-              </a:tr>
-              <a:tr h="447979">
-                <a:tc>
-                  <a:txBody>
-                    <a:bodyPr/>
-                    <a:lstStyle/>
-                    <a:p>
-                      <a:pPr algn="ctr"/>
-                      <a:r>
-                        <a:rPr lang="en-US" sz="3400" kern="1200" baseline="0" dirty="0" smtClean="0">
-                          <a:solidFill>
-                            <a:schemeClr val="dk1"/>
-                          </a:solidFill>
-                          <a:latin typeface="+mn-lt"/>
-                          <a:ea typeface="+mn-ea"/>
-                          <a:cs typeface="+mn-cs"/>
-                        </a:rPr>
-                        <a:t>&amp;</a:t>
-                      </a:r>
-                      <a:endParaRPr lang="en-US" sz="3400" dirty="0"/>
-                    </a:p>
-                  </a:txBody>
-                  <a:tcPr/>
-                </a:tc>
-                <a:tc>
-                  <a:txBody>
-                    <a:bodyPr/>
-                    <a:lstStyle/>
-                    <a:p>
-                      <a:r>
-                        <a:rPr lang="en-US" sz="3400" kern="1200" baseline="0" dirty="0" smtClean="0">
-                          <a:solidFill>
-                            <a:schemeClr val="dk1"/>
-                          </a:solidFill>
-                          <a:latin typeface="+mn-lt"/>
-                          <a:ea typeface="+mn-ea"/>
-                          <a:cs typeface="+mn-cs"/>
-                        </a:rPr>
-                        <a:t>Ampersand</a:t>
-                      </a:r>
-                      <a:endParaRPr lang="en-US" sz="3400" dirty="0"/>
-                    </a:p>
-                  </a:txBody>
-                  <a:tcPr/>
-                </a:tc>
-                <a:tc>
-                  <a:txBody>
-                    <a:bodyPr/>
-                    <a:lstStyle/>
-                    <a:p>
-                      <a:pPr algn="ctr"/>
-                      <a:r>
-                        <a:rPr lang="en-US" sz="3400" kern="1200" baseline="0" dirty="0" smtClean="0">
-                          <a:solidFill>
-                            <a:schemeClr val="dk1"/>
-                          </a:solidFill>
-                          <a:latin typeface="+mn-lt"/>
-                          <a:ea typeface="+mn-ea"/>
-                          <a:cs typeface="+mn-cs"/>
-                        </a:rPr>
-                        <a:t>&amp;amp;</a:t>
-                      </a:r>
-                      <a:endParaRPr lang="en-US" sz="3400" dirty="0"/>
-                    </a:p>
-                  </a:txBody>
-                  <a:tcPr/>
-                </a:tc>
-              </a:tr>
-              <a:tr h="447979">
-                <a:tc>
-                  <a:txBody>
-                    <a:bodyPr/>
-                    <a:lstStyle/>
-                    <a:p>
-                      <a:pPr algn="ctr"/>
-                      <a:r>
-                        <a:rPr lang="en-US" sz="3400" kern="1200" baseline="0" dirty="0" smtClean="0">
-                          <a:solidFill>
-                            <a:schemeClr val="dk1"/>
-                          </a:solidFill>
-                          <a:latin typeface="+mn-lt"/>
-                          <a:ea typeface="+mn-ea"/>
-                          <a:cs typeface="+mn-cs"/>
-                        </a:rPr>
-                        <a:t>"</a:t>
-                      </a:r>
-                      <a:endParaRPr lang="en-US" sz="3400" dirty="0"/>
-                    </a:p>
-                  </a:txBody>
-                  <a:tcPr/>
-                </a:tc>
-                <a:tc>
-                  <a:txBody>
-                    <a:bodyPr/>
-                    <a:lstStyle/>
-                    <a:p>
-                      <a:r>
-                        <a:rPr lang="en-US" sz="3400" kern="1200" baseline="0" dirty="0" smtClean="0">
-                          <a:solidFill>
-                            <a:schemeClr val="dk1"/>
-                          </a:solidFill>
-                          <a:latin typeface="+mn-lt"/>
-                          <a:ea typeface="+mn-ea"/>
-                          <a:cs typeface="+mn-cs"/>
-                        </a:rPr>
-                        <a:t>Quotation mark</a:t>
-                      </a:r>
-                      <a:endParaRPr lang="en-US" sz="3400" dirty="0"/>
-                    </a:p>
-                  </a:txBody>
-                  <a:tcPr/>
-                </a:tc>
-                <a:tc>
-                  <a:txBody>
-                    <a:bodyPr/>
-                    <a:lstStyle/>
-                    <a:p>
-                      <a:pPr algn="ctr"/>
-                      <a:r>
-                        <a:rPr lang="en-US" sz="3400" kern="1200" baseline="0" dirty="0" smtClean="0">
-                          <a:solidFill>
-                            <a:schemeClr val="dk1"/>
-                          </a:solidFill>
-                          <a:latin typeface="+mn-lt"/>
-                          <a:ea typeface="+mn-ea"/>
-                          <a:cs typeface="+mn-cs"/>
-                        </a:rPr>
-                        <a:t>&amp;amp;</a:t>
-                      </a:r>
-                      <a:endParaRPr lang="en-US" sz="3400" dirty="0"/>
-                    </a:p>
-                  </a:txBody>
-                  <a:tcPr/>
-                </a:tc>
-              </a:tr>
-            </a:tbl>
-          </a:graphicData>
-        </a:graphic>
-      </p:graphicFrame>
-    </p:spTree>
-  </p:cSld>
-  <p:clrMapOvr>
-    <a:masterClrMapping/>
-  </p:clrMapOvr>
-</p:sld>
-</file>
-
-<file path=ppt/slides/slide38.xml><?xml version="1.0" encoding="utf-8"?>
-<p:sld xmlns:a="http://schemas.openxmlformats.org/drawingml/2006/main" xmlns:r="http://schemas.openxmlformats.org/officeDocument/2006/relationships" xmlns:p="http://schemas.openxmlformats.org/presentationml/2006/main">
-  <p:cSld>
-    <p:spTree>
-      <p:nvGrpSpPr>
-        <p:cNvPr id="1" name=""/>
-        <p:cNvGrpSpPr/>
-        <p:nvPr/>
-      </p:nvGrpSpPr>
-      <p:grpSpPr>
-        <a:xfrm>
-          <a:off x="0" y="0"/>
-          <a:ext cx="0" cy="0"/>
-          <a:chOff x="0" y="0"/>
-          <a:chExt cx="0" cy="0"/>
-        </a:xfrm>
-      </p:grpSpPr>
-      <p:sp>
-        <p:nvSpPr>
-          <p:cNvPr id="70659" name="Rectangle 3"/>
-          <p:cNvSpPr>
-            <a:spLocks noGrp="1"/>
-          </p:cNvSpPr>
-          <p:nvPr>
-            <p:ph type="body" idx="4294967295"/>
-          </p:nvPr>
-        </p:nvSpPr>
-        <p:spPr>
-          <a:xfrm>
-            <a:off x="228600" y="1219200"/>
-            <a:ext cx="8534400" cy="5257800"/>
-          </a:xfrm>
-        </p:spPr>
-        <p:txBody>
-          <a:bodyPr>
-            <a:normAutofit lnSpcReduction="10000"/>
-          </a:bodyPr>
-          <a:lstStyle/>
-          <a:p>
-            <a:r>
-              <a:rPr lang="en-US" sz="2800" dirty="0" smtClean="0"/>
-              <a:t>User object represents information about the user making the request of the web server</a:t>
-            </a:r>
-          </a:p>
-          <a:p>
-            <a:pPr>
-              <a:buNone/>
-            </a:pPr>
-            <a:endParaRPr lang="en-US" sz="2800" dirty="0" smtClean="0"/>
-          </a:p>
-          <a:p>
-            <a:r>
-              <a:rPr lang="en-US" sz="2800" dirty="0" smtClean="0"/>
-              <a:t>allows you to test that user’s role membership.</a:t>
-            </a:r>
-          </a:p>
-          <a:p>
-            <a:pPr>
-              <a:buNone/>
-            </a:pPr>
-            <a:endParaRPr lang="en-US" sz="2800" dirty="0" smtClean="0"/>
-          </a:p>
-          <a:p>
-            <a:r>
-              <a:rPr lang="en-US" sz="2800" dirty="0" smtClean="0"/>
-              <a:t>Implements </a:t>
-            </a:r>
-            <a:r>
-              <a:rPr lang="en-US" sz="2800" dirty="0" err="1" smtClean="0"/>
-              <a:t>System.Security.Principal.Iprincipal</a:t>
-            </a:r>
-            <a:endParaRPr lang="en-US" sz="2800" dirty="0" smtClean="0"/>
-          </a:p>
-          <a:p>
-            <a:pPr>
-              <a:buNone/>
-            </a:pPr>
-            <a:endParaRPr lang="en-US" sz="2800" dirty="0" smtClean="0"/>
-          </a:p>
-          <a:p>
-            <a:r>
-              <a:rPr lang="en-US" sz="2800" dirty="0" smtClean="0"/>
-              <a:t>can authenticate a user based </a:t>
-            </a:r>
-            <a:r>
-              <a:rPr lang="en-US" sz="2800" dirty="0" smtClean="0"/>
-              <a:t>on specific </a:t>
-            </a:r>
-            <a:r>
-              <a:rPr lang="en-US" sz="2800" dirty="0" smtClean="0"/>
-              <a:t>class depends Windows account information using IIS or through cookie-based authentication with a dedicated login page.</a:t>
-            </a:r>
-          </a:p>
-          <a:p>
-            <a:endParaRPr lang="en-US" sz="2800" dirty="0" smtClean="0"/>
-          </a:p>
-        </p:txBody>
-      </p:sp>
-      <p:sp>
-        <p:nvSpPr>
-          <p:cNvPr id="4" name="Title 1"/>
-          <p:cNvSpPr>
-            <a:spLocks noGrp="1"/>
-          </p:cNvSpPr>
-          <p:nvPr>
-            <p:ph type="title"/>
-          </p:nvPr>
-        </p:nvSpPr>
-        <p:spPr>
-          <a:xfrm>
-            <a:off x="0" y="0"/>
-            <a:ext cx="9144000" cy="990600"/>
-          </a:xfrm>
-          <a:gradFill rotWithShape="0">
-            <a:lin/>
-          </a:gradFill>
-        </p:spPr>
-        <p:txBody>
-          <a:bodyPr>
-            <a:normAutofit/>
-          </a:bodyPr>
-          <a:lstStyle/>
-          <a:p>
-            <a:r>
-              <a:rPr lang="en-US" dirty="0" smtClean="0"/>
-              <a:t>   </a:t>
-            </a:r>
-            <a:r>
-              <a:rPr lang="en-US" dirty="0" smtClean="0"/>
-              <a:t>                                    </a:t>
-            </a:r>
-            <a:r>
-              <a:rPr lang="en-US" dirty="0" smtClean="0"/>
-              <a:t>User Object</a:t>
-            </a:r>
-          </a:p>
-        </p:txBody>
-      </p:sp>
-    </p:spTree>
-  </p:cSld>
-  <p:clrMapOvr>
-    <a:masterClrMapping/>
-  </p:clrMapOvr>
-</p:sld>
-</file>
-
 <file path=ppt/slides/slide4.xml><?xml version="1.0" encoding="utf-8"?>
 <p:sld xmlns:a="http://schemas.openxmlformats.org/drawingml/2006/main" xmlns:r="http://schemas.openxmlformats.org/officeDocument/2006/relationships" xmlns:p="http://schemas.openxmlformats.org/presentationml/2006/main">
   <p:cSld>
@@ -15892,15 +14146,7 @@
           <a:p>
             <a:r>
               <a:rPr lang="en-US" b="1" dirty="0" smtClean="0"/>
-              <a:t>   </a:t>
-            </a:r>
-            <a:r>
-              <a:rPr lang="en-US" b="1" dirty="0" smtClean="0"/>
-              <a:t>                          </a:t>
-            </a:r>
-            <a:r>
-              <a:rPr lang="en-US" b="1" dirty="0" smtClean="0"/>
-              <a:t>HTML Forms cont..</a:t>
+              <a:t>                             HTML Forms cont..</a:t>
             </a:r>
             <a:endParaRPr lang="en-US" dirty="0" smtClean="0"/>
           </a:p>
@@ -16034,6 +14280,13 @@
   <p:clrMapOvr>
     <a:masterClrMapping/>
   </p:clrMapOvr>
+  <p:timing>
+    <p:tnLst>
+      <p:par>
+        <p:cTn id="1" dur="indefinite" restart="never" nodeType="tmRoot"/>
+      </p:par>
+    </p:tnLst>
+  </p:timing>
 </p:sld>
 </file>
 
@@ -16079,15 +14332,7 @@
           <a:p>
             <a:r>
               <a:rPr lang="en-US" b="1" dirty="0" smtClean="0"/>
-              <a:t>         </a:t>
-            </a:r>
-            <a:r>
-              <a:rPr lang="en-US" b="1" dirty="0" smtClean="0"/>
-              <a:t>            Dynamic </a:t>
-            </a:r>
-            <a:r>
-              <a:rPr lang="en-US" b="1" dirty="0" smtClean="0"/>
-              <a:t>User Interface</a:t>
+              <a:t>                     Dynamic User Interface</a:t>
             </a:r>
             <a:endParaRPr lang="en-US" dirty="0" smtClean="0"/>
           </a:p>
@@ -16139,7 +14384,7 @@
         <p:spPr bwMode="auto">
           <a:xfrm>
             <a:off x="0" y="1289050"/>
-            <a:ext cx="8839200" cy="5509200"/>
+            <a:ext cx="8839200" cy="4154984"/>
           </a:xfrm>
           <a:prstGeom prst="rect">
             <a:avLst/>
@@ -16171,122 +14416,6 @@
             <a:endParaRPr lang="en-US" sz="2200" dirty="0"/>
           </a:p>
           <a:p>
-            <a:pPr>
-              <a:buFont typeface="Wingdings" pitchFamily="2" charset="2"/>
-              <a:buChar char="q"/>
-            </a:pPr>
-            <a:r>
-              <a:rPr lang="en-US" sz="2200" dirty="0"/>
-              <a:t> In classic ASP insert a script block that would write the raw HTML</a:t>
-            </a:r>
-          </a:p>
-          <a:p>
-            <a:r>
-              <a:rPr lang="en-US" sz="2200" dirty="0"/>
-              <a:t>	</a:t>
-            </a:r>
-            <a:r>
-              <a:rPr lang="en-US" sz="2200" dirty="0">
-                <a:solidFill>
-                  <a:srgbClr val="0070C0"/>
-                </a:solidFill>
-              </a:rPr>
-              <a:t>string message = "&lt;span style=\"</a:t>
-            </a:r>
-            <a:r>
-              <a:rPr lang="en-US" sz="2200" dirty="0" err="1">
-                <a:solidFill>
-                  <a:srgbClr val="0070C0"/>
-                </a:solidFill>
-              </a:rPr>
-              <a:t>color:Red</a:t>
-            </a:r>
-            <a:r>
-              <a:rPr lang="en-US" sz="2200" dirty="0">
-                <a:solidFill>
-                  <a:srgbClr val="0070C0"/>
-                </a:solidFill>
-              </a:rPr>
-              <a:t>\"&gt;Welcome " +</a:t>
-            </a:r>
-          </a:p>
-          <a:p>
-            <a:r>
-              <a:rPr lang="en-US" sz="2200" dirty="0">
-                <a:solidFill>
-                  <a:srgbClr val="0070C0"/>
-                </a:solidFill>
-              </a:rPr>
-              <a:t>	</a:t>
-            </a:r>
-            <a:r>
-              <a:rPr lang="en-US" sz="2200" dirty="0" err="1">
-                <a:solidFill>
-                  <a:srgbClr val="0070C0"/>
-                </a:solidFill>
-              </a:rPr>
-              <a:t>FirstName</a:t>
-            </a:r>
-            <a:r>
-              <a:rPr lang="en-US" sz="2200" dirty="0">
-                <a:solidFill>
-                  <a:srgbClr val="0070C0"/>
-                </a:solidFill>
-              </a:rPr>
-              <a:t> + " " + </a:t>
-            </a:r>
-            <a:r>
-              <a:rPr lang="en-US" sz="2200" dirty="0" err="1">
-                <a:solidFill>
-                  <a:srgbClr val="0070C0"/>
-                </a:solidFill>
-              </a:rPr>
-              <a:t>LastName</a:t>
-            </a:r>
-            <a:r>
-              <a:rPr lang="en-US" sz="2200" dirty="0">
-                <a:solidFill>
-                  <a:srgbClr val="0070C0"/>
-                </a:solidFill>
-              </a:rPr>
-              <a:t> + "&lt;/span&gt;";</a:t>
-            </a:r>
-          </a:p>
-          <a:p>
-            <a:r>
-              <a:rPr lang="en-US" sz="2200" dirty="0">
-                <a:solidFill>
-                  <a:srgbClr val="0070C0"/>
-                </a:solidFill>
-              </a:rPr>
-              <a:t>	</a:t>
-            </a:r>
-            <a:r>
-              <a:rPr lang="en-US" sz="2200" dirty="0" err="1">
-                <a:solidFill>
-                  <a:srgbClr val="0070C0"/>
-                </a:solidFill>
-              </a:rPr>
-              <a:t>Response.Write</a:t>
-            </a:r>
-            <a:r>
-              <a:rPr lang="en-US" sz="2200" dirty="0">
-                <a:solidFill>
-                  <a:srgbClr val="0070C0"/>
-                </a:solidFill>
-              </a:rPr>
-              <a:t>(message</a:t>
-            </a:r>
-            <a:r>
-              <a:rPr lang="en-US" sz="2200" dirty="0" smtClean="0">
-                <a:solidFill>
-                  <a:srgbClr val="0070C0"/>
-                </a:solidFill>
-              </a:rPr>
-              <a:t>);</a:t>
-            </a:r>
-          </a:p>
-          <a:p>
             <a:endParaRPr lang="en-US" sz="2200" dirty="0">
               <a:solidFill>
                 <a:srgbClr val="0070C0"/>
@@ -16299,8 +14428,12 @@
               <a:buChar char="q"/>
             </a:pPr>
             <a:r>
+              <a:rPr lang="en-US" sz="2200" smtClean="0"/>
+              <a:t>with </a:t>
+            </a:r>
+            <a:r>
               <a:rPr lang="en-US" sz="2200" dirty="0"/>
-              <a:t> On the other hand, with Label control in ASP.NET</a:t>
+              <a:t>Label control in ASP.NET</a:t>
             </a:r>
           </a:p>
           <a:p>
@@ -16577,15 +14710,7 @@
           <a:p>
             <a:r>
               <a:rPr lang="en-US" b="1" dirty="0" smtClean="0"/>
-              <a:t>       </a:t>
-            </a:r>
-            <a:r>
-              <a:rPr lang="en-US" b="1" dirty="0" smtClean="0"/>
-              <a:t>        The </a:t>
-            </a:r>
-            <a:r>
-              <a:rPr lang="en-US" b="1" dirty="0" smtClean="0"/>
-              <a:t>ASP.NET Event Model</a:t>
+              <a:t>               The ASP.NET Event Model</a:t>
             </a:r>
             <a:endParaRPr lang="en-US" dirty="0" smtClean="0"/>
           </a:p>
@@ -16691,7 +14816,6 @@
               <a:rPr lang="en-US" sz="2800" dirty="0" smtClean="0"/>
               <a:t>More  code for even simple web page.</a:t>
             </a:r>
-            <a:endParaRPr lang="en-US" sz="2800" dirty="0" smtClean="0"/>
           </a:p>
           <a:p>
             <a:pPr>
@@ -16736,36 +14860,20 @@
                   <a:srgbClr val="CC00CC"/>
                 </a:solidFill>
               </a:rPr>
-              <a:t> </a:t>
-            </a:r>
+              <a:t>  script code must determine which button is clicked</a:t>
+            </a:r>
+          </a:p>
+          <a:p>
+            <a:pPr>
+              <a:defRPr/>
+            </a:pPr>
             <a:r>
               <a:rPr lang="en-US" sz="2800" dirty="0" smtClean="0">
                 <a:solidFill>
                   <a:srgbClr val="CC00CC"/>
                 </a:solidFill>
               </a:rPr>
-              <a:t> script code must determine which button is clicked</a:t>
-            </a:r>
-          </a:p>
-          <a:p>
-            <a:pPr>
-              <a:defRPr/>
-            </a:pPr>
-            <a:r>
-              <a:rPr lang="en-US" sz="2800" dirty="0" smtClean="0">
-                <a:solidFill>
-                  <a:srgbClr val="CC00CC"/>
-                </a:solidFill>
-              </a:rPr>
-              <a:t> </a:t>
-            </a:r>
-            <a:r>
-              <a:rPr lang="en-US" sz="2800" dirty="0" smtClean="0">
-                <a:solidFill>
-                  <a:srgbClr val="CC00CC"/>
-                </a:solidFill>
-              </a:rPr>
-              <a:t>     and execute code accordingly</a:t>
+              <a:t>      and execute code accordingly</a:t>
             </a:r>
           </a:p>
           <a:p>
@@ -17696,7 +15804,6 @@
               <a:rPr lang="en-US" sz="2800" b="1" dirty="0" smtClean="0"/>
               <a:t>Your page runs for the first time. ASP.NET creates page, &amp; control objects, the initialization code executes, and then the page is rendered to HTML and returned to the client. </a:t>
             </a:r>
-            <a:endParaRPr lang="en-US" sz="2800" b="1" dirty="0" smtClean="0"/>
           </a:p>
           <a:p>
             <a:pPr marL="514350" indent="-514350">
@@ -17722,11 +15829,7 @@
             </a:r>
             <a:r>
               <a:rPr lang="en-US" sz="2800" b="1" dirty="0" smtClean="0"/>
-              <a:t>, such as clicking a button. &amp; page is submitted with all the form data</a:t>
-            </a:r>
-            <a:r>
-              <a:rPr lang="en-US" sz="2800" b="1" dirty="0" smtClean="0"/>
-              <a:t>.</a:t>
+              <a:t>, such as clicking a button. &amp; page is submitted with all the form data.</a:t>
             </a:r>
           </a:p>
           <a:p>
@@ -18258,11 +16361,7 @@
             </a:r>
             <a:r>
               <a:rPr lang="en-US" sz="2800" b="1" dirty="0" smtClean="0"/>
-              <a:t>Next</a:t>
-            </a:r>
-            <a:r>
-              <a:rPr lang="en-US" sz="2800" b="1" dirty="0" smtClean="0"/>
-              <a:t>, ASP.NET checks what operation triggered the </a:t>
+              <a:t>Next, ASP.NET checks what operation triggered the </a:t>
             </a:r>
             <a:r>
               <a:rPr lang="en-US" sz="2800" b="1" dirty="0" err="1" smtClean="0"/>
@@ -18270,11 +16369,7 @@
             </a:r>
             <a:r>
               <a:rPr lang="en-US" sz="2800" b="1" dirty="0" smtClean="0"/>
-              <a:t>, and raises the appropriate event </a:t>
-            </a:r>
-            <a:r>
-              <a:rPr lang="en-US" sz="2800" b="1" dirty="0" smtClean="0"/>
-              <a:t>procedure.</a:t>
+              <a:t>, and raises the appropriate event procedure.</a:t>
             </a:r>
           </a:p>
           <a:p>
@@ -18423,6 +16518,13 @@
   <p:clrMapOvr>
     <a:masterClrMapping/>
   </p:clrMapOvr>
+  <p:timing>
+    <p:tnLst>
+      <p:par>
+        <p:cTn id="1" dur="indefinite" restart="never" nodeType="tmRoot"/>
+      </p:par>
+    </p:tnLst>
+  </p:timing>
 </p:sld>
 </file>
 

</xml_diff>